<commit_message>
Finished the top 10
</commit_message>
<xml_diff>
--- a/9-5 Things That I Love Hate About Actor Framework.pptx
+++ b/9-5 Things That I Love Hate About Actor Framework.pptx
@@ -5,7 +5,7 @@
     <p:sldMasterId id="2147483648" r:id="rId1"/>
   </p:sldMasterIdLst>
   <p:notesMasterIdLst>
-    <p:notesMasterId r:id="rId8"/>
+    <p:notesMasterId r:id="rId17"/>
   </p:notesMasterIdLst>
   <p:sldIdLst>
     <p:sldId id="256" r:id="rId2"/>
@@ -14,6 +14,15 @@
     <p:sldId id="258" r:id="rId5"/>
     <p:sldId id="259" r:id="rId6"/>
     <p:sldId id="260" r:id="rId7"/>
+    <p:sldId id="262" r:id="rId8"/>
+    <p:sldId id="264" r:id="rId9"/>
+    <p:sldId id="265" r:id="rId10"/>
+    <p:sldId id="266" r:id="rId11"/>
+    <p:sldId id="267" r:id="rId12"/>
+    <p:sldId id="268" r:id="rId13"/>
+    <p:sldId id="269" r:id="rId14"/>
+    <p:sldId id="270" r:id="rId15"/>
+    <p:sldId id="263" r:id="rId16"/>
   </p:sldIdLst>
   <p:sldSz cx="9144000" cy="6858000" type="screen4x3"/>
   <p:notesSz cx="6858000" cy="9144000"/>
@@ -3657,6 +3666,460 @@
 </p:sld>
 </file>
 
+<file path=ppt/slides/slide10.xml><?xml version="1.0" encoding="utf-8"?>
+<p:sld xmlns:a="http://schemas.openxmlformats.org/drawingml/2006/main" xmlns:r="http://schemas.openxmlformats.org/officeDocument/2006/relationships" xmlns:p="http://schemas.openxmlformats.org/presentationml/2006/main">
+  <p:cSld>
+    <p:spTree>
+      <p:nvGrpSpPr>
+        <p:cNvPr id="1" name=""/>
+        <p:cNvGrpSpPr/>
+        <p:nvPr/>
+      </p:nvGrpSpPr>
+      <p:grpSpPr>
+        <a:xfrm>
+          <a:off x="0" y="0"/>
+          <a:ext cx="0" cy="0"/>
+          <a:chOff x="0" y="0"/>
+          <a:chExt cx="0" cy="0"/>
+        </a:xfrm>
+      </p:grpSpPr>
+      <p:sp>
+        <p:nvSpPr>
+          <p:cNvPr id="2" name="Title 1"/>
+          <p:cNvSpPr>
+            <a:spLocks noGrp="1"/>
+          </p:cNvSpPr>
+          <p:nvPr>
+            <p:ph type="title"/>
+          </p:nvPr>
+        </p:nvSpPr>
+        <p:spPr/>
+        <p:txBody>
+          <a:bodyPr>
+            <a:normAutofit fontScale="90000"/>
+          </a:bodyPr>
+          <a:lstStyle/>
+          <a:p>
+            <a:r>
+              <a:rPr lang="en-US" dirty="0" smtClean="0"/>
+              <a:t>#5 Love:  Focus</a:t>
+            </a:r>
+            <a:r>
+              <a:rPr lang="en-US" baseline="0" dirty="0" smtClean="0"/>
+              <a:t> on my app, no software design</a:t>
+            </a:r>
+            <a:endParaRPr lang="en-US" dirty="0"/>
+          </a:p>
+        </p:txBody>
+      </p:sp>
+      <p:sp>
+        <p:nvSpPr>
+          <p:cNvPr id="3" name="Content Placeholder 2"/>
+          <p:cNvSpPr>
+            <a:spLocks noGrp="1"/>
+          </p:cNvSpPr>
+          <p:nvPr>
+            <p:ph idx="1"/>
+          </p:nvPr>
+        </p:nvSpPr>
+        <p:spPr/>
+        <p:txBody>
+          <a:bodyPr/>
+          <a:lstStyle/>
+          <a:p>
+            <a:endParaRPr lang="en-US"/>
+          </a:p>
+        </p:txBody>
+      </p:sp>
+    </p:spTree>
+    <p:extLst>
+      <p:ext uri="{BB962C8B-B14F-4D97-AF65-F5344CB8AC3E}">
+        <p14:creationId xmlns:p14="http://schemas.microsoft.com/office/powerpoint/2010/main" val="3590099751"/>
+      </p:ext>
+    </p:extLst>
+  </p:cSld>
+  <p:clrMapOvr>
+    <a:masterClrMapping/>
+  </p:clrMapOvr>
+</p:sld>
+</file>
+
+<file path=ppt/slides/slide11.xml><?xml version="1.0" encoding="utf-8"?>
+<p:sld xmlns:a="http://schemas.openxmlformats.org/drawingml/2006/main" xmlns:r="http://schemas.openxmlformats.org/officeDocument/2006/relationships" xmlns:p="http://schemas.openxmlformats.org/presentationml/2006/main">
+  <p:cSld>
+    <p:spTree>
+      <p:nvGrpSpPr>
+        <p:cNvPr id="1" name=""/>
+        <p:cNvGrpSpPr/>
+        <p:nvPr/>
+      </p:nvGrpSpPr>
+      <p:grpSpPr>
+        <a:xfrm>
+          <a:off x="0" y="0"/>
+          <a:ext cx="0" cy="0"/>
+          <a:chOff x="0" y="0"/>
+          <a:chExt cx="0" cy="0"/>
+        </a:xfrm>
+      </p:grpSpPr>
+      <p:sp>
+        <p:nvSpPr>
+          <p:cNvPr id="2" name="Title 1"/>
+          <p:cNvSpPr>
+            <a:spLocks noGrp="1"/>
+          </p:cNvSpPr>
+          <p:nvPr>
+            <p:ph type="title"/>
+          </p:nvPr>
+        </p:nvSpPr>
+        <p:spPr/>
+        <p:txBody>
+          <a:bodyPr>
+            <a:normAutofit fontScale="90000"/>
+          </a:bodyPr>
+          <a:lstStyle/>
+          <a:p>
+            <a:r>
+              <a:rPr lang="en-US" dirty="0" smtClean="0"/>
+              <a:t>#4 Hate: Things</a:t>
+            </a:r>
+            <a:r>
+              <a:rPr lang="en-US" baseline="0" dirty="0" smtClean="0"/>
+              <a:t> that should be simple are a kludge</a:t>
+            </a:r>
+            <a:endParaRPr lang="en-US" dirty="0"/>
+          </a:p>
+        </p:txBody>
+      </p:sp>
+      <p:sp>
+        <p:nvSpPr>
+          <p:cNvPr id="3" name="Content Placeholder 2"/>
+          <p:cNvSpPr>
+            <a:spLocks noGrp="1"/>
+          </p:cNvSpPr>
+          <p:nvPr>
+            <p:ph idx="1"/>
+          </p:nvPr>
+        </p:nvSpPr>
+        <p:spPr/>
+        <p:txBody>
+          <a:bodyPr/>
+          <a:lstStyle/>
+          <a:p>
+            <a:endParaRPr lang="en-US"/>
+          </a:p>
+        </p:txBody>
+      </p:sp>
+    </p:spTree>
+    <p:extLst>
+      <p:ext uri="{BB962C8B-B14F-4D97-AF65-F5344CB8AC3E}">
+        <p14:creationId xmlns:p14="http://schemas.microsoft.com/office/powerpoint/2010/main" val="1200024498"/>
+      </p:ext>
+    </p:extLst>
+  </p:cSld>
+  <p:clrMapOvr>
+    <a:masterClrMapping/>
+  </p:clrMapOvr>
+</p:sld>
+</file>
+
+<file path=ppt/slides/slide12.xml><?xml version="1.0" encoding="utf-8"?>
+<p:sld xmlns:a="http://schemas.openxmlformats.org/drawingml/2006/main" xmlns:r="http://schemas.openxmlformats.org/officeDocument/2006/relationships" xmlns:p="http://schemas.openxmlformats.org/presentationml/2006/main">
+  <p:cSld>
+    <p:spTree>
+      <p:nvGrpSpPr>
+        <p:cNvPr id="1" name=""/>
+        <p:cNvGrpSpPr/>
+        <p:nvPr/>
+      </p:nvGrpSpPr>
+      <p:grpSpPr>
+        <a:xfrm>
+          <a:off x="0" y="0"/>
+          <a:ext cx="0" cy="0"/>
+          <a:chOff x="0" y="0"/>
+          <a:chExt cx="0" cy="0"/>
+        </a:xfrm>
+      </p:grpSpPr>
+      <p:sp>
+        <p:nvSpPr>
+          <p:cNvPr id="2" name="Title 1"/>
+          <p:cNvSpPr>
+            <a:spLocks noGrp="1"/>
+          </p:cNvSpPr>
+          <p:nvPr>
+            <p:ph type="title"/>
+          </p:nvPr>
+        </p:nvSpPr>
+        <p:spPr/>
+        <p:txBody>
+          <a:bodyPr/>
+          <a:lstStyle/>
+          <a:p>
+            <a:r>
+              <a:rPr lang="en-US" dirty="0" smtClean="0"/>
+              <a:t>#3 Love:  Inspire others</a:t>
+            </a:r>
+            <a:endParaRPr lang="en-US" dirty="0"/>
+          </a:p>
+        </p:txBody>
+      </p:sp>
+      <p:sp>
+        <p:nvSpPr>
+          <p:cNvPr id="3" name="Content Placeholder 2"/>
+          <p:cNvSpPr>
+            <a:spLocks noGrp="1"/>
+          </p:cNvSpPr>
+          <p:nvPr>
+            <p:ph idx="1"/>
+          </p:nvPr>
+        </p:nvSpPr>
+        <p:spPr/>
+        <p:txBody>
+          <a:bodyPr/>
+          <a:lstStyle/>
+          <a:p>
+            <a:endParaRPr lang="en-US"/>
+          </a:p>
+        </p:txBody>
+      </p:sp>
+    </p:spTree>
+    <p:extLst>
+      <p:ext uri="{BB962C8B-B14F-4D97-AF65-F5344CB8AC3E}">
+        <p14:creationId xmlns:p14="http://schemas.microsoft.com/office/powerpoint/2010/main" val="4195226854"/>
+      </p:ext>
+    </p:extLst>
+  </p:cSld>
+  <p:clrMapOvr>
+    <a:masterClrMapping/>
+  </p:clrMapOvr>
+</p:sld>
+</file>
+
+<file path=ppt/slides/slide13.xml><?xml version="1.0" encoding="utf-8"?>
+<p:sld xmlns:a="http://schemas.openxmlformats.org/drawingml/2006/main" xmlns:r="http://schemas.openxmlformats.org/officeDocument/2006/relationships" xmlns:p="http://schemas.openxmlformats.org/presentationml/2006/main">
+  <p:cSld>
+    <p:spTree>
+      <p:nvGrpSpPr>
+        <p:cNvPr id="1" name=""/>
+        <p:cNvGrpSpPr/>
+        <p:nvPr/>
+      </p:nvGrpSpPr>
+      <p:grpSpPr>
+        <a:xfrm>
+          <a:off x="0" y="0"/>
+          <a:ext cx="0" cy="0"/>
+          <a:chOff x="0" y="0"/>
+          <a:chExt cx="0" cy="0"/>
+        </a:xfrm>
+      </p:grpSpPr>
+      <p:sp>
+        <p:nvSpPr>
+          <p:cNvPr id="2" name="Title 1"/>
+          <p:cNvSpPr>
+            <a:spLocks noGrp="1"/>
+          </p:cNvSpPr>
+          <p:nvPr>
+            <p:ph type="title"/>
+          </p:nvPr>
+        </p:nvSpPr>
+        <p:spPr/>
+        <p:txBody>
+          <a:bodyPr>
+            <a:normAutofit fontScale="90000"/>
+          </a:bodyPr>
+          <a:lstStyle/>
+          <a:p>
+            <a:r>
+              <a:rPr lang="en-US" dirty="0" smtClean="0"/>
+              <a:t>#2 Hate:  Missing design guidelines – How do I look at AF Code and know</a:t>
+            </a:r>
+            <a:r>
+              <a:rPr lang="en-US" baseline="0" dirty="0" smtClean="0"/>
+              <a:t> it is well designed</a:t>
+            </a:r>
+            <a:endParaRPr lang="en-US" dirty="0"/>
+          </a:p>
+        </p:txBody>
+      </p:sp>
+      <p:sp>
+        <p:nvSpPr>
+          <p:cNvPr id="3" name="Content Placeholder 2"/>
+          <p:cNvSpPr>
+            <a:spLocks noGrp="1"/>
+          </p:cNvSpPr>
+          <p:nvPr>
+            <p:ph idx="1"/>
+          </p:nvPr>
+        </p:nvSpPr>
+        <p:spPr/>
+        <p:txBody>
+          <a:bodyPr/>
+          <a:lstStyle/>
+          <a:p>
+            <a:endParaRPr lang="en-US"/>
+          </a:p>
+        </p:txBody>
+      </p:sp>
+    </p:spTree>
+    <p:extLst>
+      <p:ext uri="{BB962C8B-B14F-4D97-AF65-F5344CB8AC3E}">
+        <p14:creationId xmlns:p14="http://schemas.microsoft.com/office/powerpoint/2010/main" val="2870020414"/>
+      </p:ext>
+    </p:extLst>
+  </p:cSld>
+  <p:clrMapOvr>
+    <a:masterClrMapping/>
+  </p:clrMapOvr>
+</p:sld>
+</file>
+
+<file path=ppt/slides/slide14.xml><?xml version="1.0" encoding="utf-8"?>
+<p:sld xmlns:a="http://schemas.openxmlformats.org/drawingml/2006/main" xmlns:r="http://schemas.openxmlformats.org/officeDocument/2006/relationships" xmlns:p="http://schemas.openxmlformats.org/presentationml/2006/main">
+  <p:cSld>
+    <p:spTree>
+      <p:nvGrpSpPr>
+        <p:cNvPr id="1" name=""/>
+        <p:cNvGrpSpPr/>
+        <p:nvPr/>
+      </p:nvGrpSpPr>
+      <p:grpSpPr>
+        <a:xfrm>
+          <a:off x="0" y="0"/>
+          <a:ext cx="0" cy="0"/>
+          <a:chOff x="0" y="0"/>
+          <a:chExt cx="0" cy="0"/>
+        </a:xfrm>
+      </p:grpSpPr>
+      <p:sp>
+        <p:nvSpPr>
+          <p:cNvPr id="2" name="Title 1"/>
+          <p:cNvSpPr>
+            <a:spLocks noGrp="1"/>
+          </p:cNvSpPr>
+          <p:nvPr>
+            <p:ph type="title"/>
+          </p:nvPr>
+        </p:nvSpPr>
+        <p:spPr/>
+        <p:txBody>
+          <a:bodyPr/>
+          <a:lstStyle/>
+          <a:p>
+            <a:r>
+              <a:rPr lang="en-US" dirty="0" smtClean="0"/>
+              <a:t>#1 Love:  </a:t>
+            </a:r>
+            <a:r>
+              <a:rPr lang="en-US" smtClean="0"/>
+              <a:t>Inherit</a:t>
+            </a:r>
+            <a:r>
+              <a:rPr lang="en-US" baseline="0" smtClean="0"/>
+              <a:t> Process</a:t>
+            </a:r>
+            <a:endParaRPr lang="en-US"/>
+          </a:p>
+        </p:txBody>
+      </p:sp>
+      <p:sp>
+        <p:nvSpPr>
+          <p:cNvPr id="3" name="Content Placeholder 2"/>
+          <p:cNvSpPr>
+            <a:spLocks noGrp="1"/>
+          </p:cNvSpPr>
+          <p:nvPr>
+            <p:ph idx="1"/>
+          </p:nvPr>
+        </p:nvSpPr>
+        <p:spPr/>
+        <p:txBody>
+          <a:bodyPr/>
+          <a:lstStyle/>
+          <a:p>
+            <a:endParaRPr lang="en-US"/>
+          </a:p>
+        </p:txBody>
+      </p:sp>
+    </p:spTree>
+    <p:extLst>
+      <p:ext uri="{BB962C8B-B14F-4D97-AF65-F5344CB8AC3E}">
+        <p14:creationId xmlns:p14="http://schemas.microsoft.com/office/powerpoint/2010/main" val="1945336395"/>
+      </p:ext>
+    </p:extLst>
+  </p:cSld>
+  <p:clrMapOvr>
+    <a:masterClrMapping/>
+  </p:clrMapOvr>
+</p:sld>
+</file>
+
+<file path=ppt/slides/slide15.xml><?xml version="1.0" encoding="utf-8"?>
+<p:sld xmlns:a="http://schemas.openxmlformats.org/drawingml/2006/main" xmlns:r="http://schemas.openxmlformats.org/officeDocument/2006/relationships" xmlns:p="http://schemas.openxmlformats.org/presentationml/2006/main">
+  <p:cSld>
+    <p:spTree>
+      <p:nvGrpSpPr>
+        <p:cNvPr id="1" name=""/>
+        <p:cNvGrpSpPr/>
+        <p:nvPr/>
+      </p:nvGrpSpPr>
+      <p:grpSpPr>
+        <a:xfrm>
+          <a:off x="0" y="0"/>
+          <a:ext cx="0" cy="0"/>
+          <a:chOff x="0" y="0"/>
+          <a:chExt cx="0" cy="0"/>
+        </a:xfrm>
+      </p:grpSpPr>
+      <p:sp>
+        <p:nvSpPr>
+          <p:cNvPr id="2" name="Title 1"/>
+          <p:cNvSpPr>
+            <a:spLocks noGrp="1"/>
+          </p:cNvSpPr>
+          <p:nvPr>
+            <p:ph type="title"/>
+          </p:nvPr>
+        </p:nvSpPr>
+        <p:spPr/>
+        <p:txBody>
+          <a:bodyPr/>
+          <a:lstStyle/>
+          <a:p>
+            <a:endParaRPr lang="en-US" dirty="0"/>
+          </a:p>
+        </p:txBody>
+      </p:sp>
+      <p:sp>
+        <p:nvSpPr>
+          <p:cNvPr id="3" name="Content Placeholder 2"/>
+          <p:cNvSpPr>
+            <a:spLocks noGrp="1"/>
+          </p:cNvSpPr>
+          <p:nvPr>
+            <p:ph idx="1"/>
+          </p:nvPr>
+        </p:nvSpPr>
+        <p:spPr/>
+        <p:txBody>
+          <a:bodyPr/>
+          <a:lstStyle/>
+          <a:p>
+            <a:endParaRPr lang="en-US"/>
+          </a:p>
+        </p:txBody>
+      </p:sp>
+    </p:spTree>
+    <p:extLst>
+      <p:ext uri="{BB962C8B-B14F-4D97-AF65-F5344CB8AC3E}">
+        <p14:creationId xmlns:p14="http://schemas.microsoft.com/office/powerpoint/2010/main" val="3185381702"/>
+      </p:ext>
+    </p:extLst>
+  </p:cSld>
+  <p:clrMapOvr>
+    <a:masterClrMapping/>
+  </p:clrMapOvr>
+</p:sld>
+</file>
+
 <file path=ppt/slides/slide2.xml><?xml version="1.0" encoding="utf-8"?>
 <p:sld xmlns:a="http://schemas.openxmlformats.org/drawingml/2006/main" xmlns:r="http://schemas.openxmlformats.org/officeDocument/2006/relationships" xmlns:p="http://schemas.openxmlformats.org/presentationml/2006/main">
   <p:cSld>
@@ -5522,16 +5985,22 @@
         </p:nvSpPr>
         <p:spPr/>
         <p:txBody>
-          <a:bodyPr/>
+          <a:bodyPr>
+            <a:normAutofit fontScale="90000"/>
+          </a:bodyPr>
           <a:lstStyle/>
           <a:p>
             <a:r>
               <a:rPr lang="en-US" dirty="0" smtClean="0"/>
-              <a:t>9.5 No</a:t>
+              <a:t>#9.5 Love/Hate -No</a:t>
             </a:r>
             <a:r>
               <a:rPr lang="en-US" baseline="0" dirty="0" smtClean="0"/>
-              <a:t> Training Course</a:t>
+              <a:t> </a:t>
+            </a:r>
+            <a:r>
+              <a:rPr lang="en-US" baseline="0" dirty="0" smtClean="0"/>
+              <a:t>Training Course</a:t>
             </a:r>
             <a:endParaRPr lang="en-US" dirty="0"/>
           </a:p>
@@ -5610,7 +6079,11 @@
           <a:p>
             <a:r>
               <a:rPr lang="en-US" dirty="0" smtClean="0"/>
-              <a:t>9 AF is Mind Candy!!</a:t>
+              <a:t>#9 Love: </a:t>
+            </a:r>
+            <a:r>
+              <a:rPr lang="en-US" dirty="0" smtClean="0"/>
+              <a:t>AF is Mind Candy!!</a:t>
             </a:r>
             <a:endParaRPr lang="en-US" dirty="0"/>
           </a:p>
@@ -5655,10 +6128,7 @@
               <a:rPr lang="en-US" baseline="0" dirty="0" err="1" smtClean="0"/>
               <a:t>Shortz</a:t>
             </a:r>
-            <a:endParaRPr lang="en-US" baseline="0" smtClean="0"/>
-          </a:p>
-          <a:p>
-            <a:endParaRPr lang="en-US"/>
+            <a:endParaRPr lang="en-US" baseline="0" dirty="0" smtClean="0"/>
           </a:p>
         </p:txBody>
       </p:sp>
@@ -5666,6 +6136,234 @@
     <p:extLst>
       <p:ext uri="{BB962C8B-B14F-4D97-AF65-F5344CB8AC3E}">
         <p14:creationId xmlns:p14="http://schemas.microsoft.com/office/powerpoint/2010/main" val="685537377"/>
+      </p:ext>
+    </p:extLst>
+  </p:cSld>
+  <p:clrMapOvr>
+    <a:masterClrMapping/>
+  </p:clrMapOvr>
+</p:sld>
+</file>
+
+<file path=ppt/slides/slide7.xml><?xml version="1.0" encoding="utf-8"?>
+<p:sld xmlns:a="http://schemas.openxmlformats.org/drawingml/2006/main" xmlns:r="http://schemas.openxmlformats.org/officeDocument/2006/relationships" xmlns:p="http://schemas.openxmlformats.org/presentationml/2006/main">
+  <p:cSld>
+    <p:spTree>
+      <p:nvGrpSpPr>
+        <p:cNvPr id="1" name=""/>
+        <p:cNvGrpSpPr/>
+        <p:nvPr/>
+      </p:nvGrpSpPr>
+      <p:grpSpPr>
+        <a:xfrm>
+          <a:off x="0" y="0"/>
+          <a:ext cx="0" cy="0"/>
+          <a:chOff x="0" y="0"/>
+          <a:chExt cx="0" cy="0"/>
+        </a:xfrm>
+      </p:grpSpPr>
+      <p:sp>
+        <p:nvSpPr>
+          <p:cNvPr id="2" name="Title 1"/>
+          <p:cNvSpPr>
+            <a:spLocks noGrp="1"/>
+          </p:cNvSpPr>
+          <p:nvPr>
+            <p:ph type="title"/>
+          </p:nvPr>
+        </p:nvSpPr>
+        <p:spPr/>
+        <p:txBody>
+          <a:bodyPr/>
+          <a:lstStyle/>
+          <a:p>
+            <a:r>
+              <a:rPr lang="en-US" dirty="0" smtClean="0"/>
+              <a:t>#8</a:t>
+            </a:r>
+            <a:r>
+              <a:rPr lang="en-US" baseline="0" dirty="0" smtClean="0"/>
+              <a:t> </a:t>
+            </a:r>
+            <a:r>
+              <a:rPr lang="en-US" baseline="0" dirty="0" err="1" smtClean="0"/>
+              <a:t>Hate:Heavy</a:t>
+            </a:r>
+            <a:r>
+              <a:rPr lang="en-US" baseline="0" dirty="0" smtClean="0"/>
+              <a:t>/Bloat</a:t>
+            </a:r>
+            <a:endParaRPr lang="en-US" dirty="0"/>
+          </a:p>
+        </p:txBody>
+      </p:sp>
+      <p:sp>
+        <p:nvSpPr>
+          <p:cNvPr id="3" name="Content Placeholder 2"/>
+          <p:cNvSpPr>
+            <a:spLocks noGrp="1"/>
+          </p:cNvSpPr>
+          <p:nvPr>
+            <p:ph idx="1"/>
+          </p:nvPr>
+        </p:nvSpPr>
+        <p:spPr/>
+        <p:txBody>
+          <a:bodyPr/>
+          <a:lstStyle/>
+          <a:p>
+            <a:endParaRPr lang="en-US"/>
+          </a:p>
+        </p:txBody>
+      </p:sp>
+    </p:spTree>
+    <p:extLst>
+      <p:ext uri="{BB962C8B-B14F-4D97-AF65-F5344CB8AC3E}">
+        <p14:creationId xmlns:p14="http://schemas.microsoft.com/office/powerpoint/2010/main" val="3959911511"/>
+      </p:ext>
+    </p:extLst>
+  </p:cSld>
+  <p:clrMapOvr>
+    <a:masterClrMapping/>
+  </p:clrMapOvr>
+</p:sld>
+</file>
+
+<file path=ppt/slides/slide8.xml><?xml version="1.0" encoding="utf-8"?>
+<p:sld xmlns:a="http://schemas.openxmlformats.org/drawingml/2006/main" xmlns:r="http://schemas.openxmlformats.org/officeDocument/2006/relationships" xmlns:p="http://schemas.openxmlformats.org/presentationml/2006/main">
+  <p:cSld>
+    <p:spTree>
+      <p:nvGrpSpPr>
+        <p:cNvPr id="1" name=""/>
+        <p:cNvGrpSpPr/>
+        <p:nvPr/>
+      </p:nvGrpSpPr>
+      <p:grpSpPr>
+        <a:xfrm>
+          <a:off x="0" y="0"/>
+          <a:ext cx="0" cy="0"/>
+          <a:chOff x="0" y="0"/>
+          <a:chExt cx="0" cy="0"/>
+        </a:xfrm>
+      </p:grpSpPr>
+      <p:sp>
+        <p:nvSpPr>
+          <p:cNvPr id="2" name="Title 1"/>
+          <p:cNvSpPr>
+            <a:spLocks noGrp="1"/>
+          </p:cNvSpPr>
+          <p:nvPr>
+            <p:ph type="title"/>
+          </p:nvPr>
+        </p:nvSpPr>
+        <p:spPr/>
+        <p:txBody>
+          <a:bodyPr/>
+          <a:lstStyle/>
+          <a:p>
+            <a:r>
+              <a:rPr lang="en-US" dirty="0" smtClean="0"/>
+              <a:t>#7 Love: Think Differently</a:t>
+            </a:r>
+            <a:endParaRPr lang="en-US" dirty="0"/>
+          </a:p>
+        </p:txBody>
+      </p:sp>
+      <p:sp>
+        <p:nvSpPr>
+          <p:cNvPr id="3" name="Content Placeholder 2"/>
+          <p:cNvSpPr>
+            <a:spLocks noGrp="1"/>
+          </p:cNvSpPr>
+          <p:nvPr>
+            <p:ph idx="1"/>
+          </p:nvPr>
+        </p:nvSpPr>
+        <p:spPr/>
+        <p:txBody>
+          <a:bodyPr/>
+          <a:lstStyle/>
+          <a:p>
+            <a:endParaRPr lang="en-US"/>
+          </a:p>
+        </p:txBody>
+      </p:sp>
+    </p:spTree>
+    <p:extLst>
+      <p:ext uri="{BB962C8B-B14F-4D97-AF65-F5344CB8AC3E}">
+        <p14:creationId xmlns:p14="http://schemas.microsoft.com/office/powerpoint/2010/main" val="1711450606"/>
+      </p:ext>
+    </p:extLst>
+  </p:cSld>
+  <p:clrMapOvr>
+    <a:masterClrMapping/>
+  </p:clrMapOvr>
+</p:sld>
+</file>
+
+<file path=ppt/slides/slide9.xml><?xml version="1.0" encoding="utf-8"?>
+<p:sld xmlns:a="http://schemas.openxmlformats.org/drawingml/2006/main" xmlns:r="http://schemas.openxmlformats.org/officeDocument/2006/relationships" xmlns:p="http://schemas.openxmlformats.org/presentationml/2006/main">
+  <p:cSld>
+    <p:spTree>
+      <p:nvGrpSpPr>
+        <p:cNvPr id="1" name=""/>
+        <p:cNvGrpSpPr/>
+        <p:nvPr/>
+      </p:nvGrpSpPr>
+      <p:grpSpPr>
+        <a:xfrm>
+          <a:off x="0" y="0"/>
+          <a:ext cx="0" cy="0"/>
+          <a:chOff x="0" y="0"/>
+          <a:chExt cx="0" cy="0"/>
+        </a:xfrm>
+      </p:grpSpPr>
+      <p:sp>
+        <p:nvSpPr>
+          <p:cNvPr id="2" name="Title 1"/>
+          <p:cNvSpPr>
+            <a:spLocks noGrp="1"/>
+          </p:cNvSpPr>
+          <p:nvPr>
+            <p:ph type="title"/>
+          </p:nvPr>
+        </p:nvSpPr>
+        <p:spPr/>
+        <p:txBody>
+          <a:bodyPr/>
+          <a:lstStyle/>
+          <a:p>
+            <a:r>
+              <a:rPr lang="en-US" dirty="0" smtClean="0"/>
+              <a:t>#6 Hate:  Breaks Dataflow</a:t>
+            </a:r>
+            <a:endParaRPr lang="en-US" dirty="0"/>
+          </a:p>
+        </p:txBody>
+      </p:sp>
+      <p:sp>
+        <p:nvSpPr>
+          <p:cNvPr id="3" name="Content Placeholder 2"/>
+          <p:cNvSpPr>
+            <a:spLocks noGrp="1"/>
+          </p:cNvSpPr>
+          <p:nvPr>
+            <p:ph idx="1"/>
+          </p:nvPr>
+        </p:nvSpPr>
+        <p:spPr/>
+        <p:txBody>
+          <a:bodyPr/>
+          <a:lstStyle/>
+          <a:p>
+            <a:endParaRPr lang="en-US"/>
+          </a:p>
+        </p:txBody>
+      </p:sp>
+    </p:spTree>
+    <p:extLst>
+      <p:ext uri="{BB962C8B-B14F-4D97-AF65-F5344CB8AC3E}">
+        <p14:creationId xmlns:p14="http://schemas.microsoft.com/office/powerpoint/2010/main" val="1112208837"/>
       </p:ext>
     </p:extLst>
   </p:cSld>

</xml_diff>

<commit_message>
Initial 9.5 Done in flight
</commit_message>
<xml_diff>
--- a/9-5 Things That I Love Hate About Actor Framework.pptx
+++ b/9-5 Things That I Love Hate About Actor Framework.pptx
@@ -5,24 +5,25 @@
     <p:sldMasterId id="2147483648" r:id="rId1"/>
   </p:sldMasterIdLst>
   <p:notesMasterIdLst>
-    <p:notesMasterId r:id="rId17"/>
+    <p:notesMasterId r:id="rId18"/>
   </p:notesMasterIdLst>
   <p:sldIdLst>
     <p:sldId id="256" r:id="rId2"/>
     <p:sldId id="261" r:id="rId3"/>
     <p:sldId id="257" r:id="rId4"/>
     <p:sldId id="258" r:id="rId5"/>
-    <p:sldId id="259" r:id="rId6"/>
-    <p:sldId id="260" r:id="rId7"/>
-    <p:sldId id="262" r:id="rId8"/>
-    <p:sldId id="264" r:id="rId9"/>
-    <p:sldId id="265" r:id="rId10"/>
-    <p:sldId id="266" r:id="rId11"/>
-    <p:sldId id="269" r:id="rId12"/>
-    <p:sldId id="268" r:id="rId13"/>
-    <p:sldId id="267" r:id="rId14"/>
-    <p:sldId id="270" r:id="rId15"/>
-    <p:sldId id="263" r:id="rId16"/>
+    <p:sldId id="271" r:id="rId6"/>
+    <p:sldId id="259" r:id="rId7"/>
+    <p:sldId id="260" r:id="rId8"/>
+    <p:sldId id="262" r:id="rId9"/>
+    <p:sldId id="264" r:id="rId10"/>
+    <p:sldId id="265" r:id="rId11"/>
+    <p:sldId id="266" r:id="rId12"/>
+    <p:sldId id="269" r:id="rId13"/>
+    <p:sldId id="268" r:id="rId14"/>
+    <p:sldId id="267" r:id="rId15"/>
+    <p:sldId id="270" r:id="rId16"/>
+    <p:sldId id="263" r:id="rId17"/>
   </p:sldIdLst>
   <p:sldSz cx="9144000" cy="6858000" type="screen4x3"/>
   <p:notesSz cx="6858000" cy="9144000"/>
@@ -3695,18 +3696,12 @@
         </p:nvSpPr>
         <p:spPr/>
         <p:txBody>
-          <a:bodyPr>
-            <a:normAutofit fontScale="90000"/>
-          </a:bodyPr>
+          <a:bodyPr/>
           <a:lstStyle/>
           <a:p>
             <a:r>
               <a:rPr lang="en-US" dirty="0" smtClean="0"/>
-              <a:t>#5 Love:  Focus</a:t>
-            </a:r>
-            <a:r>
-              <a:rPr lang="en-US" baseline="0" dirty="0" smtClean="0"/>
-              <a:t> on my app, no software design</a:t>
+              <a:t>#6 Hate:  Breaks Dataflow</a:t>
             </a:r>
             <a:endParaRPr lang="en-US" dirty="0"/>
           </a:p>
@@ -3734,7 +3729,7 @@
     </p:spTree>
     <p:extLst>
       <p:ext uri="{BB962C8B-B14F-4D97-AF65-F5344CB8AC3E}">
-        <p14:creationId xmlns:p14="http://schemas.microsoft.com/office/powerpoint/2010/main" val="3590099751"/>
+        <p14:creationId xmlns:p14="http://schemas.microsoft.com/office/powerpoint/2010/main" val="1112208837"/>
       </p:ext>
     </p:extLst>
   </p:cSld>
@@ -3780,11 +3775,11 @@
           <a:p>
             <a:r>
               <a:rPr lang="en-US" dirty="0" smtClean="0"/>
-              <a:t>#2 Hate:  Missing design guidelines – How do I look at AF Code and know</a:t>
+              <a:t>#5 Love:  Focus</a:t>
             </a:r>
             <a:r>
               <a:rPr lang="en-US" baseline="0" dirty="0" smtClean="0"/>
-              <a:t> it is well designed</a:t>
+              <a:t> on my app, no software design</a:t>
             </a:r>
             <a:endParaRPr lang="en-US" dirty="0"/>
           </a:p>
@@ -3812,7 +3807,7 @@
     </p:spTree>
     <p:extLst>
       <p:ext uri="{BB962C8B-B14F-4D97-AF65-F5344CB8AC3E}">
-        <p14:creationId xmlns:p14="http://schemas.microsoft.com/office/powerpoint/2010/main" val="2870020414"/>
+        <p14:creationId xmlns:p14="http://schemas.microsoft.com/office/powerpoint/2010/main" val="3590099751"/>
       </p:ext>
     </p:extLst>
   </p:cSld>
@@ -3851,12 +3846,18 @@
         </p:nvSpPr>
         <p:spPr/>
         <p:txBody>
-          <a:bodyPr/>
+          <a:bodyPr>
+            <a:normAutofit fontScale="90000"/>
+          </a:bodyPr>
           <a:lstStyle/>
           <a:p>
             <a:r>
               <a:rPr lang="en-US" dirty="0" smtClean="0"/>
-              <a:t>#3 Love:  Inspire others</a:t>
+              <a:t>#4 Hate:  Missing design guidelines – How do I look at AF Code and know</a:t>
+            </a:r>
+            <a:r>
+              <a:rPr lang="en-US" baseline="0" dirty="0" smtClean="0"/>
+              <a:t> it is well designed</a:t>
             </a:r>
             <a:endParaRPr lang="en-US" dirty="0"/>
           </a:p>
@@ -3884,7 +3885,7 @@
     </p:spTree>
     <p:extLst>
       <p:ext uri="{BB962C8B-B14F-4D97-AF65-F5344CB8AC3E}">
-        <p14:creationId xmlns:p14="http://schemas.microsoft.com/office/powerpoint/2010/main" val="4195226854"/>
+        <p14:creationId xmlns:p14="http://schemas.microsoft.com/office/powerpoint/2010/main" val="2870020414"/>
       </p:ext>
     </p:extLst>
   </p:cSld>
@@ -3923,18 +3924,12 @@
         </p:nvSpPr>
         <p:spPr/>
         <p:txBody>
-          <a:bodyPr>
-            <a:normAutofit fontScale="90000"/>
-          </a:bodyPr>
+          <a:bodyPr/>
           <a:lstStyle/>
           <a:p>
             <a:r>
               <a:rPr lang="en-US" dirty="0" smtClean="0"/>
-              <a:t>#4 Hate: Things</a:t>
-            </a:r>
-            <a:r>
-              <a:rPr lang="en-US" baseline="0" dirty="0" smtClean="0"/>
-              <a:t> that should be simple are a kludge</a:t>
+              <a:t>#3 Love:  Inspire others</a:t>
             </a:r>
             <a:endParaRPr lang="en-US" dirty="0"/>
           </a:p>
@@ -3962,7 +3957,7 @@
     </p:spTree>
     <p:extLst>
       <p:ext uri="{BB962C8B-B14F-4D97-AF65-F5344CB8AC3E}">
-        <p14:creationId xmlns:p14="http://schemas.microsoft.com/office/powerpoint/2010/main" val="1200024498"/>
+        <p14:creationId xmlns:p14="http://schemas.microsoft.com/office/powerpoint/2010/main" val="4195226854"/>
       </p:ext>
     </p:extLst>
   </p:cSld>
@@ -4001,6 +3996,84 @@
         </p:nvSpPr>
         <p:spPr/>
         <p:txBody>
+          <a:bodyPr>
+            <a:normAutofit fontScale="90000"/>
+          </a:bodyPr>
+          <a:lstStyle/>
+          <a:p>
+            <a:r>
+              <a:rPr lang="en-US" dirty="0" smtClean="0"/>
+              <a:t>#2 Hate: Things</a:t>
+            </a:r>
+            <a:r>
+              <a:rPr lang="en-US" baseline="0" dirty="0" smtClean="0"/>
+              <a:t> that should be simple are a kludge</a:t>
+            </a:r>
+            <a:endParaRPr lang="en-US" dirty="0"/>
+          </a:p>
+        </p:txBody>
+      </p:sp>
+      <p:sp>
+        <p:nvSpPr>
+          <p:cNvPr id="3" name="Content Placeholder 2"/>
+          <p:cNvSpPr>
+            <a:spLocks noGrp="1"/>
+          </p:cNvSpPr>
+          <p:nvPr>
+            <p:ph idx="1"/>
+          </p:nvPr>
+        </p:nvSpPr>
+        <p:spPr/>
+        <p:txBody>
+          <a:bodyPr/>
+          <a:lstStyle/>
+          <a:p>
+            <a:endParaRPr lang="en-US" dirty="0"/>
+          </a:p>
+        </p:txBody>
+      </p:sp>
+    </p:spTree>
+    <p:extLst>
+      <p:ext uri="{BB962C8B-B14F-4D97-AF65-F5344CB8AC3E}">
+        <p14:creationId xmlns:p14="http://schemas.microsoft.com/office/powerpoint/2010/main" val="1200024498"/>
+      </p:ext>
+    </p:extLst>
+  </p:cSld>
+  <p:clrMapOvr>
+    <a:masterClrMapping/>
+  </p:clrMapOvr>
+</p:sld>
+</file>
+
+<file path=ppt/slides/slide15.xml><?xml version="1.0" encoding="utf-8"?>
+<p:sld xmlns:a="http://schemas.openxmlformats.org/drawingml/2006/main" xmlns:r="http://schemas.openxmlformats.org/officeDocument/2006/relationships" xmlns:p="http://schemas.openxmlformats.org/presentationml/2006/main">
+  <p:cSld>
+    <p:spTree>
+      <p:nvGrpSpPr>
+        <p:cNvPr id="1" name=""/>
+        <p:cNvGrpSpPr/>
+        <p:nvPr/>
+      </p:nvGrpSpPr>
+      <p:grpSpPr>
+        <a:xfrm>
+          <a:off x="0" y="0"/>
+          <a:ext cx="0" cy="0"/>
+          <a:chOff x="0" y="0"/>
+          <a:chExt cx="0" cy="0"/>
+        </a:xfrm>
+      </p:grpSpPr>
+      <p:sp>
+        <p:nvSpPr>
+          <p:cNvPr id="2" name="Title 1"/>
+          <p:cNvSpPr>
+            <a:spLocks noGrp="1"/>
+          </p:cNvSpPr>
+          <p:nvPr>
+            <p:ph type="title"/>
+          </p:nvPr>
+        </p:nvSpPr>
+        <p:spPr/>
+        <p:txBody>
           <a:bodyPr/>
           <a:lstStyle/>
           <a:p>
@@ -4048,7 +4121,7 @@
 </p:sld>
 </file>
 
-<file path=ppt/slides/slide15.xml><?xml version="1.0" encoding="utf-8"?>
+<file path=ppt/slides/slide16.xml><?xml version="1.0" encoding="utf-8"?>
 <p:sld xmlns:a="http://schemas.openxmlformats.org/drawingml/2006/main" xmlns:r="http://schemas.openxmlformats.org/officeDocument/2006/relationships" xmlns:p="http://schemas.openxmlformats.org/presentationml/2006/main">
   <p:cSld>
     <p:spTree>
@@ -4313,10 +4386,6 @@
               <a:rPr lang="en-US" baseline="0" dirty="0" smtClean="0"/>
               <a:t>“Know Your Place in Space and Time and Orient Yourself” Peggy Noonan.  </a:t>
             </a:r>
-          </a:p>
-          <a:p>
-            <a:pPr lvl="1"/>
-            <a:endParaRPr lang="en-US" dirty="0"/>
           </a:p>
         </p:txBody>
       </p:sp>
@@ -5981,22 +6050,12 @@
         </p:nvSpPr>
         <p:spPr/>
         <p:txBody>
-          <a:bodyPr>
-            <a:normAutofit fontScale="90000"/>
-          </a:bodyPr>
+          <a:bodyPr/>
           <a:lstStyle/>
           <a:p>
             <a:r>
               <a:rPr lang="en-US" dirty="0" smtClean="0"/>
-              <a:t>#9.5 Love/Hate -No</a:t>
-            </a:r>
-            <a:r>
-              <a:rPr lang="en-US" baseline="0" dirty="0" smtClean="0"/>
-              <a:t> </a:t>
-            </a:r>
-            <a:r>
-              <a:rPr lang="en-US" baseline="0" dirty="0" smtClean="0"/>
-              <a:t>Training Course</a:t>
+              <a:t>Notes to Nancy:  Not included yet?</a:t>
             </a:r>
             <a:endParaRPr lang="en-US" dirty="0"/>
           </a:p>
@@ -6019,19 +6078,58 @@
           <a:p>
             <a:r>
               <a:rPr lang="en-US" dirty="0" smtClean="0"/>
-              <a:t>But that is</a:t>
-            </a:r>
-            <a:r>
-              <a:rPr lang="en-US" baseline="0" dirty="0" smtClean="0"/>
-              <a:t> changing now!</a:t>
-            </a:r>
+              <a:t>Limited communication chain</a:t>
+            </a:r>
+          </a:p>
+          <a:p>
+            <a:r>
+              <a:rPr lang="en-US" dirty="0" smtClean="0"/>
+              <a:t>Still have to determine shutdown process</a:t>
+            </a:r>
+          </a:p>
+          <a:p>
+            <a:r>
+              <a:rPr lang="en-US" dirty="0" smtClean="0"/>
+              <a:t>Still can encounter race conditions – </a:t>
+            </a:r>
+            <a:r>
+              <a:rPr lang="en-US" dirty="0" err="1" smtClean="0"/>
+              <a:t>suceptible</a:t>
+            </a:r>
+            <a:r>
+              <a:rPr lang="en-US" dirty="0" smtClean="0"/>
+              <a:t> with certain messaging</a:t>
+            </a:r>
+          </a:p>
+          <a:p>
+            <a:r>
+              <a:rPr lang="en-US" dirty="0" smtClean="0"/>
+              <a:t>Defined messages</a:t>
+            </a:r>
+          </a:p>
+          <a:p>
+            <a:r>
+              <a:rPr lang="en-US" dirty="0" smtClean="0"/>
+              <a:t>Helps learn LabVIEW</a:t>
+            </a:r>
+          </a:p>
+          <a:p>
+            <a:r>
+              <a:rPr lang="en-US" dirty="0" smtClean="0"/>
+              <a:t>Need </a:t>
+            </a:r>
+            <a:r>
+              <a:rPr lang="en-US" smtClean="0"/>
+              <a:t>more examples</a:t>
+            </a:r>
+            <a:endParaRPr lang="en-US" dirty="0"/>
           </a:p>
         </p:txBody>
       </p:sp>
     </p:spTree>
     <p:extLst>
       <p:ext uri="{BB962C8B-B14F-4D97-AF65-F5344CB8AC3E}">
-        <p14:creationId xmlns:p14="http://schemas.microsoft.com/office/powerpoint/2010/main" val="3065881857"/>
+        <p14:creationId xmlns:p14="http://schemas.microsoft.com/office/powerpoint/2010/main" val="1150112902"/>
       </p:ext>
     </p:extLst>
   </p:cSld>
@@ -6070,68 +6168,57 @@
         </p:nvSpPr>
         <p:spPr/>
         <p:txBody>
-          <a:bodyPr/>
+          <a:bodyPr>
+            <a:normAutofit fontScale="90000"/>
+          </a:bodyPr>
           <a:lstStyle/>
           <a:p>
             <a:r>
               <a:rPr lang="en-US" dirty="0" smtClean="0"/>
-              <a:t>#9 Love: </a:t>
-            </a:r>
+              <a:t>#9.5 Love/Hate -No</a:t>
+            </a:r>
+            <a:r>
+              <a:rPr lang="en-US" baseline="0" dirty="0" smtClean="0"/>
+              <a:t> </a:t>
+            </a:r>
+            <a:r>
+              <a:rPr lang="en-US" baseline="0" dirty="0" smtClean="0"/>
+              <a:t>Training Course</a:t>
+            </a:r>
+            <a:endParaRPr lang="en-US" dirty="0"/>
+          </a:p>
+        </p:txBody>
+      </p:sp>
+      <p:sp>
+        <p:nvSpPr>
+          <p:cNvPr id="3" name="Content Placeholder 2"/>
+          <p:cNvSpPr>
+            <a:spLocks noGrp="1"/>
+          </p:cNvSpPr>
+          <p:nvPr>
+            <p:ph idx="1"/>
+          </p:nvPr>
+        </p:nvSpPr>
+        <p:spPr/>
+        <p:txBody>
+          <a:bodyPr/>
+          <a:lstStyle/>
+          <a:p>
             <a:r>
               <a:rPr lang="en-US" dirty="0" smtClean="0"/>
-              <a:t>AF is Mind Candy!!</a:t>
-            </a:r>
-            <a:endParaRPr lang="en-US" dirty="0"/>
-          </a:p>
-        </p:txBody>
-      </p:sp>
-      <p:sp>
-        <p:nvSpPr>
-          <p:cNvPr id="3" name="Content Placeholder 2"/>
-          <p:cNvSpPr>
-            <a:spLocks noGrp="1"/>
-          </p:cNvSpPr>
-          <p:nvPr>
-            <p:ph idx="1"/>
-          </p:nvPr>
-        </p:nvSpPr>
-        <p:spPr/>
-        <p:txBody>
-          <a:bodyPr/>
-          <a:lstStyle/>
-          <a:p>
-            <a:r>
-              <a:rPr lang="en-US" dirty="0" smtClean="0"/>
-              <a:t>Like</a:t>
+              <a:t>But that is</a:t>
             </a:r>
             <a:r>
               <a:rPr lang="en-US" baseline="0" dirty="0" smtClean="0"/>
-              <a:t> a fun logic game. </a:t>
-            </a:r>
-          </a:p>
-          <a:p>
-            <a:r>
-              <a:rPr lang="en-US" baseline="0" dirty="0" smtClean="0"/>
-              <a:t>Figuring it out is fun </a:t>
-            </a:r>
-          </a:p>
-          <a:p>
-            <a:r>
-              <a:rPr lang="en-US" baseline="0" dirty="0" smtClean="0"/>
-              <a:t>“Gee I am so cleaver” Bill </a:t>
-            </a:r>
-            <a:r>
-              <a:rPr lang="en-US" baseline="0" dirty="0" err="1" smtClean="0"/>
-              <a:t>Shortz</a:t>
-            </a:r>
-            <a:endParaRPr lang="en-US" baseline="0" dirty="0" smtClean="0"/>
+              <a:t> changing now!</a:t>
+            </a:r>
           </a:p>
         </p:txBody>
       </p:sp>
     </p:spTree>
     <p:extLst>
       <p:ext uri="{BB962C8B-B14F-4D97-AF65-F5344CB8AC3E}">
-        <p14:creationId xmlns:p14="http://schemas.microsoft.com/office/powerpoint/2010/main" val="685537377"/>
+        <p14:creationId xmlns:p14="http://schemas.microsoft.com/office/powerpoint/2010/main" val="3065881857"/>
       </p:ext>
     </p:extLst>
   </p:cSld>
@@ -6175,47 +6262,63 @@
           <a:p>
             <a:r>
               <a:rPr lang="en-US" dirty="0" smtClean="0"/>
-              <a:t>#8</a:t>
+              <a:t>#9 Love: </a:t>
+            </a:r>
+            <a:r>
+              <a:rPr lang="en-US" dirty="0" smtClean="0"/>
+              <a:t>AF is Mind Candy!!</a:t>
+            </a:r>
+            <a:endParaRPr lang="en-US" dirty="0"/>
+          </a:p>
+        </p:txBody>
+      </p:sp>
+      <p:sp>
+        <p:nvSpPr>
+          <p:cNvPr id="3" name="Content Placeholder 2"/>
+          <p:cNvSpPr>
+            <a:spLocks noGrp="1"/>
+          </p:cNvSpPr>
+          <p:nvPr>
+            <p:ph idx="1"/>
+          </p:nvPr>
+        </p:nvSpPr>
+        <p:spPr/>
+        <p:txBody>
+          <a:bodyPr/>
+          <a:lstStyle/>
+          <a:p>
+            <a:r>
+              <a:rPr lang="en-US" dirty="0" smtClean="0"/>
+              <a:t>Like</a:t>
             </a:r>
             <a:r>
               <a:rPr lang="en-US" baseline="0" dirty="0" smtClean="0"/>
-              <a:t> </a:t>
+              <a:t> a fun logic game. </a:t>
+            </a:r>
+          </a:p>
+          <a:p>
+            <a:r>
+              <a:rPr lang="en-US" baseline="0" dirty="0" smtClean="0"/>
+              <a:t>Figuring it out is fun </a:t>
+            </a:r>
+          </a:p>
+          <a:p>
+            <a:r>
+              <a:rPr lang="en-US" baseline="0" dirty="0" smtClean="0"/>
+              <a:t>“Gee I am so cleaver” Bill </a:t>
             </a:r>
             <a:r>
               <a:rPr lang="en-US" baseline="0" dirty="0" err="1" smtClean="0"/>
-              <a:t>Hate:Heavy</a:t>
-            </a:r>
-            <a:r>
-              <a:rPr lang="en-US" baseline="0" dirty="0" smtClean="0"/>
-              <a:t>/Bloat</a:t>
-            </a:r>
-            <a:endParaRPr lang="en-US" dirty="0"/>
-          </a:p>
-        </p:txBody>
-      </p:sp>
-      <p:sp>
-        <p:nvSpPr>
-          <p:cNvPr id="3" name="Content Placeholder 2"/>
-          <p:cNvSpPr>
-            <a:spLocks noGrp="1"/>
-          </p:cNvSpPr>
-          <p:nvPr>
-            <p:ph idx="1"/>
-          </p:nvPr>
-        </p:nvSpPr>
-        <p:spPr/>
-        <p:txBody>
-          <a:bodyPr/>
-          <a:lstStyle/>
-          <a:p>
-            <a:endParaRPr lang="en-US"/>
+              <a:t>Shortz</a:t>
+            </a:r>
+            <a:endParaRPr lang="en-US" baseline="0" dirty="0" smtClean="0"/>
           </a:p>
         </p:txBody>
       </p:sp>
     </p:spTree>
     <p:extLst>
       <p:ext uri="{BB962C8B-B14F-4D97-AF65-F5344CB8AC3E}">
-        <p14:creationId xmlns:p14="http://schemas.microsoft.com/office/powerpoint/2010/main" val="3959911511"/>
+        <p14:creationId xmlns:p14="http://schemas.microsoft.com/office/powerpoint/2010/main" val="685537377"/>
       </p:ext>
     </p:extLst>
   </p:cSld>
@@ -6259,7 +6362,11 @@
           <a:p>
             <a:r>
               <a:rPr lang="en-US" dirty="0" smtClean="0"/>
-              <a:t>#7 Love: Think Differently</a:t>
+              <a:t>#8</a:t>
+            </a:r>
+            <a:r>
+              <a:rPr lang="en-US" baseline="0" dirty="0" smtClean="0"/>
+              <a:t> Hate: Heavy/Bloat</a:t>
             </a:r>
             <a:endParaRPr lang="en-US" dirty="0"/>
           </a:p>
@@ -6287,7 +6394,7 @@
     </p:spTree>
     <p:extLst>
       <p:ext uri="{BB962C8B-B14F-4D97-AF65-F5344CB8AC3E}">
-        <p14:creationId xmlns:p14="http://schemas.microsoft.com/office/powerpoint/2010/main" val="1711450606"/>
+        <p14:creationId xmlns:p14="http://schemas.microsoft.com/office/powerpoint/2010/main" val="3959911511"/>
       </p:ext>
     </p:extLst>
   </p:cSld>
@@ -6331,7 +6438,7 @@
           <a:p>
             <a:r>
               <a:rPr lang="en-US" dirty="0" smtClean="0"/>
-              <a:t>#6 Hate:  Breaks Dataflow</a:t>
+              <a:t>#7 Love: Think Differently</a:t>
             </a:r>
             <a:endParaRPr lang="en-US" dirty="0"/>
           </a:p>
@@ -6359,7 +6466,7 @@
     </p:spTree>
     <p:extLst>
       <p:ext uri="{BB962C8B-B14F-4D97-AF65-F5344CB8AC3E}">
-        <p14:creationId xmlns:p14="http://schemas.microsoft.com/office/powerpoint/2010/main" val="1112208837"/>
+        <p14:creationId xmlns:p14="http://schemas.microsoft.com/office/powerpoint/2010/main" val="1711450606"/>
       </p:ext>
     </p:extLst>
   </p:cSld>

</xml_diff>